<commit_message>
Atualização da apresentação referente à ERS.
</commit_message>
<xml_diff>
--- a/Documentação/Especificação de Requisitos de Software/Apresentação.pptx
+++ b/Documentação/Especificação de Requisitos de Software/Apresentação.pptx
@@ -203,7 +203,7 @@
             <a:fld id="{D4D74DF4-3340-4C2C-BFD7-DAF2CAB91795}" type="datetimeFigureOut">
               <a:rPr lang="pt-BR" smtClean="0"/>
               <a:pPr/>
-              <a:t>19/05/2009</a:t>
+              <a:t>20/05/2009</a:t>
             </a:fld>
             <a:endParaRPr lang="pt-BR"/>
           </a:p>
@@ -1620,7 +1620,7 @@
             <a:fld id="{2E700DB3-DBF0-4086-B675-117E7A9610B8}" type="datetimeFigureOut">
               <a:rPr lang="pt-BR" smtClean="0"/>
               <a:pPr/>
-              <a:t>19/05/2009</a:t>
+              <a:t>20/05/2009</a:t>
             </a:fld>
             <a:endParaRPr lang="pt-BR"/>
           </a:p>
@@ -1845,7 +1845,7 @@
             <a:fld id="{2E700DB3-DBF0-4086-B675-117E7A9610B8}" type="datetimeFigureOut">
               <a:rPr lang="pt-BR" smtClean="0"/>
               <a:pPr/>
-              <a:t>19/05/2009</a:t>
+              <a:t>20/05/2009</a:t>
             </a:fld>
             <a:endParaRPr lang="pt-BR"/>
           </a:p>
@@ -2127,7 +2127,7 @@
             <a:fld id="{2E700DB3-DBF0-4086-B675-117E7A9610B8}" type="datetimeFigureOut">
               <a:rPr lang="pt-BR" smtClean="0"/>
               <a:pPr/>
-              <a:t>19/05/2009</a:t>
+              <a:t>20/05/2009</a:t>
             </a:fld>
             <a:endParaRPr lang="pt-BR"/>
           </a:p>
@@ -2308,7 +2308,7 @@
             <a:fld id="{2E700DB3-DBF0-4086-B675-117E7A9610B8}" type="datetimeFigureOut">
               <a:rPr lang="pt-BR" smtClean="0"/>
               <a:pPr/>
-              <a:t>19/05/2009</a:t>
+              <a:t>20/05/2009</a:t>
             </a:fld>
             <a:endParaRPr lang="pt-BR"/>
           </a:p>
@@ -2668,7 +2668,7 @@
             <a:fld id="{2E700DB3-DBF0-4086-B675-117E7A9610B8}" type="datetimeFigureOut">
               <a:rPr lang="pt-BR" smtClean="0"/>
               <a:pPr/>
-              <a:t>19/05/2009</a:t>
+              <a:t>20/05/2009</a:t>
             </a:fld>
             <a:endParaRPr lang="pt-BR"/>
           </a:p>
@@ -2957,7 +2957,7 @@
             <a:fld id="{2E700DB3-DBF0-4086-B675-117E7A9610B8}" type="datetimeFigureOut">
               <a:rPr lang="pt-BR" smtClean="0"/>
               <a:pPr/>
-              <a:t>19/05/2009</a:t>
+              <a:t>20/05/2009</a:t>
             </a:fld>
             <a:endParaRPr lang="pt-BR"/>
           </a:p>
@@ -3381,7 +3381,7 @@
             <a:fld id="{2E700DB3-DBF0-4086-B675-117E7A9610B8}" type="datetimeFigureOut">
               <a:rPr lang="pt-BR" smtClean="0"/>
               <a:pPr/>
-              <a:t>19/05/2009</a:t>
+              <a:t>20/05/2009</a:t>
             </a:fld>
             <a:endParaRPr lang="pt-BR"/>
           </a:p>
@@ -3498,7 +3498,7 @@
             <a:fld id="{2E700DB3-DBF0-4086-B675-117E7A9610B8}" type="datetimeFigureOut">
               <a:rPr lang="pt-BR" smtClean="0"/>
               <a:pPr/>
-              <a:t>19/05/2009</a:t>
+              <a:t>20/05/2009</a:t>
             </a:fld>
             <a:endParaRPr lang="pt-BR"/>
           </a:p>
@@ -3590,7 +3590,7 @@
             <a:fld id="{2E700DB3-DBF0-4086-B675-117E7A9610B8}" type="datetimeFigureOut">
               <a:rPr lang="pt-BR" smtClean="0"/>
               <a:pPr/>
-              <a:t>19/05/2009</a:t>
+              <a:t>20/05/2009</a:t>
             </a:fld>
             <a:endParaRPr lang="pt-BR"/>
           </a:p>
@@ -3870,7 +3870,7 @@
             <a:fld id="{2E700DB3-DBF0-4086-B675-117E7A9610B8}" type="datetimeFigureOut">
               <a:rPr lang="pt-BR" smtClean="0"/>
               <a:pPr/>
-              <a:t>19/05/2009</a:t>
+              <a:t>20/05/2009</a:t>
             </a:fld>
             <a:endParaRPr lang="pt-BR"/>
           </a:p>
@@ -4238,7 +4238,7 @@
             <a:fld id="{2E700DB3-DBF0-4086-B675-117E7A9610B8}" type="datetimeFigureOut">
               <a:rPr lang="pt-BR" smtClean="0"/>
               <a:pPr/>
-              <a:t>19/05/2009</a:t>
+              <a:t>20/05/2009</a:t>
             </a:fld>
             <a:endParaRPr lang="pt-BR"/>
           </a:p>
@@ -4677,7 +4677,7 @@
             <a:fld id="{2E700DB3-DBF0-4086-B675-117E7A9610B8}" type="datetimeFigureOut">
               <a:rPr lang="pt-BR" smtClean="0"/>
               <a:pPr/>
-              <a:t>19/05/2009</a:t>
+              <a:t>20/05/2009</a:t>
             </a:fld>
             <a:endParaRPr lang="pt-BR"/>
           </a:p>
@@ -5144,11 +5144,7 @@
           <a:p>
             <a:r>
               <a:rPr lang="pt-BR" dirty="0" smtClean="0"/>
-              <a:t>Especificação de Requisitos de </a:t>
-            </a:r>
-            <a:r>
-              <a:rPr lang="pt-BR" dirty="0" smtClean="0"/>
-              <a:t>Software - 1.00</a:t>
+              <a:t>Especificação de Requisitos de Software - 1.00</a:t>
             </a:r>
           </a:p>
         </p:txBody>
@@ -5485,31 +5481,14 @@
             <a:pPr algn="just"/>
             <a:r>
               <a:rPr lang="pt-BR" dirty="0" smtClean="0"/>
-              <a:t>Projeto, Plano de testes e Manua</a:t>
-            </a:r>
+              <a:t>Projeto, Plano de testes e Manual do Usuário 2ª versão:</a:t>
+            </a:r>
+          </a:p>
+          <a:p>
+            <a:pPr lvl="1"/>
             <a:r>
               <a:rPr lang="pt-BR" dirty="0" smtClean="0"/>
-              <a:t>l do Usuário 2ª versão</a:t>
-            </a:r>
-            <a:r>
-              <a:rPr lang="pt-BR" dirty="0" smtClean="0"/>
-              <a:t>:</a:t>
-            </a:r>
-            <a:endParaRPr lang="pt-BR" dirty="0" smtClean="0"/>
-          </a:p>
-          <a:p>
-            <a:pPr lvl="1"/>
-            <a:r>
-              <a:rPr lang="pt-BR" dirty="0" smtClean="0"/>
-              <a:t>3º </a:t>
-            </a:r>
-            <a:r>
-              <a:rPr lang="pt-BR" dirty="0" smtClean="0"/>
-              <a:t>seminário: </a:t>
-            </a:r>
-            <a:r>
-              <a:rPr lang="pt-BR" dirty="0" smtClean="0"/>
-              <a:t>08/06/2009</a:t>
+              <a:t>3º seminário: 08/06/2009</a:t>
             </a:r>
             <a:endParaRPr lang="pt-BR" dirty="0"/>
           </a:p>
@@ -5678,7 +5657,6 @@
               <a:rPr lang="pt-BR" dirty="0" smtClean="0"/>
               <a:t>Escopo e Funções</a:t>
             </a:r>
-            <a:endParaRPr lang="pt-BR" dirty="0" smtClean="0"/>
           </a:p>
           <a:p>
             <a:r>
@@ -5709,7 +5687,6 @@
               <a:rPr lang="pt-BR" dirty="0" smtClean="0"/>
               <a:t>Diagrama de Sequência</a:t>
             </a:r>
-            <a:endParaRPr lang="pt-BR" dirty="0" smtClean="0"/>
           </a:p>
           <a:p>
             <a:endParaRPr lang="pt-BR" dirty="0" smtClean="0"/>
@@ -5839,35 +5816,22 @@
             <a:pPr algn="just"/>
             <a:r>
               <a:rPr lang="pt-BR" dirty="0" smtClean="0"/>
-              <a:t>Região </a:t>
-            </a:r>
+              <a:t>Região criada pelo usuário</a:t>
+            </a:r>
+          </a:p>
+          <a:p>
+            <a:pPr algn="just"/>
             <a:r>
               <a:rPr lang="pt-BR" dirty="0" smtClean="0"/>
-              <a:t>criada pelo usuário</a:t>
+              <a:t>Criação de mapas simples</a:t>
             </a:r>
           </a:p>
           <a:p>
             <a:pPr algn="just"/>
             <a:r>
               <a:rPr lang="pt-BR" dirty="0" smtClean="0"/>
-              <a:t>Criação de mapas </a:t>
-            </a:r>
-            <a:r>
-              <a:rPr lang="pt-BR" dirty="0" smtClean="0"/>
-              <a:t>simples</a:t>
-            </a:r>
-          </a:p>
-          <a:p>
-            <a:pPr algn="just"/>
-            <a:r>
-              <a:rPr lang="pt-BR" dirty="0" smtClean="0"/>
-              <a:t>Relatórios </a:t>
-            </a:r>
-            <a:r>
-              <a:rPr lang="pt-BR" dirty="0" smtClean="0"/>
-              <a:t>claros</a:t>
-            </a:r>
-            <a:endParaRPr lang="pt-BR" dirty="0" smtClean="0"/>
+              <a:t>Relatórios claros</a:t>
+            </a:r>
           </a:p>
           <a:p>
             <a:pPr algn="just"/>
@@ -5882,7 +5846,6 @@
               <a:rPr lang="pt-BR" dirty="0" smtClean="0"/>
               <a:t>Velocidade média dos veículos</a:t>
             </a:r>
-            <a:endParaRPr lang="pt-BR" dirty="0" smtClean="0"/>
           </a:p>
           <a:p>
             <a:pPr lvl="1" algn="just"/>
@@ -6581,26 +6544,38 @@
           </a:p>
         </p:txBody>
       </p:sp>
-      <p:graphicFrame>
-        <p:nvGraphicFramePr>
-          <p:cNvPr id="4099" name="Object 3"/>
-          <p:cNvGraphicFramePr>
-            <a:graphicFrameLocks noChangeAspect="1"/>
-          </p:cNvGraphicFramePr>
+      <p:pic>
+        <p:nvPicPr>
+          <p:cNvPr id="4101" name="Picture 5"/>
+          <p:cNvPicPr>
+            <a:picLocks noChangeAspect="1" noChangeArrowheads="1"/>
+          </p:cNvPicPr>
           <p:nvPr/>
-        </p:nvGraphicFramePr>
-        <p:xfrm>
-          <a:off x="1857356" y="1571613"/>
-          <a:ext cx="5429288" cy="5072098"/>
-        </p:xfrm>
-        <a:graphic>
-          <a:graphicData uri="http://schemas.openxmlformats.org/presentationml/2006/ole">
-            <p:oleObj spid="_x0000_s4099" name="Visio" r:id="rId4" imgW="6093033" imgH="6544553" progId="Visio.Drawing.11">
-              <p:embed/>
-            </p:oleObj>
-          </a:graphicData>
-        </a:graphic>
-      </p:graphicFrame>
+        </p:nvPicPr>
+        <p:blipFill>
+          <a:blip r:embed="rId3"/>
+          <a:srcRect/>
+          <a:stretch>
+            <a:fillRect/>
+          </a:stretch>
+        </p:blipFill>
+        <p:spPr bwMode="auto">
+          <a:xfrm>
+            <a:off x="1785918" y="1571647"/>
+            <a:ext cx="5686425" cy="5000625"/>
+          </a:xfrm>
+          <a:prstGeom prst="rect">
+            <a:avLst/>
+          </a:prstGeom>
+          <a:noFill/>
+          <a:ln w="9525">
+            <a:noFill/>
+            <a:miter lim="800000"/>
+            <a:headEnd/>
+            <a:tailEnd/>
+          </a:ln>
+        </p:spPr>
+      </p:pic>
     </p:spTree>
   </p:cSld>
   <p:clrMapOvr>

</xml_diff>